<commit_message>
added comment and prepare it for the repository to go public
</commit_message>
<xml_diff>
--- a/JOVP_architecture.pptx
+++ b/JOVP_architecture.pptx
@@ -197,7 +197,7 @@
           <a:p>
             <a:fld id="{F3FD4430-1EDB-D249-AB8E-AAEDA19585D0}" type="datetimeFigureOut">
               <a:rPr lang="en-US" smtClean="0"/>
-              <a:t>8/12/22</a:t>
+              <a:t>7/2/24</a:t>
             </a:fld>
             <a:endParaRPr lang="en-US"/>
           </a:p>
@@ -695,7 +695,7 @@
           <a:p>
             <a:fld id="{C0C673CD-C2B2-3141-AA57-9FD886C46B35}" type="datetime1">
               <a:rPr lang="en-GB" smtClean="0"/>
-              <a:t>12/08/2022</a:t>
+              <a:t>02/07/2024</a:t>
             </a:fld>
             <a:endParaRPr lang="en-US"/>
           </a:p>
@@ -893,7 +893,7 @@
           <a:p>
             <a:fld id="{35C78C9C-326A-FD40-843D-A89562655032}" type="datetime1">
               <a:rPr lang="en-GB" smtClean="0"/>
-              <a:t>12/08/2022</a:t>
+              <a:t>02/07/2024</a:t>
             </a:fld>
             <a:endParaRPr lang="en-US"/>
           </a:p>
@@ -1101,7 +1101,7 @@
           <a:p>
             <a:fld id="{55353740-1FCB-5E4B-84FB-F7BBFB61BAA6}" type="datetime1">
               <a:rPr lang="en-GB" smtClean="0"/>
-              <a:t>12/08/2022</a:t>
+              <a:t>02/07/2024</a:t>
             </a:fld>
             <a:endParaRPr lang="en-US"/>
           </a:p>
@@ -1299,7 +1299,7 @@
           <a:p>
             <a:fld id="{9FF7A7B1-2A4D-B64F-98FB-ED1B5413DE0F}" type="datetime1">
               <a:rPr lang="en-GB" smtClean="0"/>
-              <a:t>12/08/2022</a:t>
+              <a:t>02/07/2024</a:t>
             </a:fld>
             <a:endParaRPr lang="en-US"/>
           </a:p>
@@ -1574,7 +1574,7 @@
           <a:p>
             <a:fld id="{507FA5FF-D472-1B45-957C-BFC592D1AAB2}" type="datetime1">
               <a:rPr lang="en-GB" smtClean="0"/>
-              <a:t>12/08/2022</a:t>
+              <a:t>02/07/2024</a:t>
             </a:fld>
             <a:endParaRPr lang="en-US"/>
           </a:p>
@@ -1839,7 +1839,7 @@
           <a:p>
             <a:fld id="{BEEAF012-E323-F048-B5E1-8280C5706330}" type="datetime1">
               <a:rPr lang="en-GB" smtClean="0"/>
-              <a:t>12/08/2022</a:t>
+              <a:t>02/07/2024</a:t>
             </a:fld>
             <a:endParaRPr lang="en-US"/>
           </a:p>
@@ -2251,7 +2251,7 @@
           <a:p>
             <a:fld id="{1C931C83-8824-4348-AD43-D35CFDB37597}" type="datetime1">
               <a:rPr lang="en-GB" smtClean="0"/>
-              <a:t>12/08/2022</a:t>
+              <a:t>02/07/2024</a:t>
             </a:fld>
             <a:endParaRPr lang="en-US"/>
           </a:p>
@@ -2392,7 +2392,7 @@
           <a:p>
             <a:fld id="{D14F735D-1788-104F-BAA1-97FB0AF83FC6}" type="datetime1">
               <a:rPr lang="en-GB" smtClean="0"/>
-              <a:t>12/08/2022</a:t>
+              <a:t>02/07/2024</a:t>
             </a:fld>
             <a:endParaRPr lang="en-US"/>
           </a:p>
@@ -2505,7 +2505,7 @@
           <a:p>
             <a:fld id="{20FAD879-E93A-E04F-A285-DA9EF53C8C63}" type="datetime1">
               <a:rPr lang="en-GB" smtClean="0"/>
-              <a:t>12/08/2022</a:t>
+              <a:t>02/07/2024</a:t>
             </a:fld>
             <a:endParaRPr lang="en-US"/>
           </a:p>
@@ -2816,7 +2816,7 @@
           <a:p>
             <a:fld id="{8417C0CD-7861-2C4F-BA52-C51AB06FA966}" type="datetime1">
               <a:rPr lang="en-GB" smtClean="0"/>
-              <a:t>12/08/2022</a:t>
+              <a:t>02/07/2024</a:t>
             </a:fld>
             <a:endParaRPr lang="en-US"/>
           </a:p>
@@ -3104,7 +3104,7 @@
           <a:p>
             <a:fld id="{4BB7101B-E218-B84E-807E-D14368F33E5D}" type="datetime1">
               <a:rPr lang="en-GB" smtClean="0"/>
-              <a:t>12/08/2022</a:t>
+              <a:t>02/07/2024</a:t>
             </a:fld>
             <a:endParaRPr lang="en-US"/>
           </a:p>
@@ -3345,7 +3345,7 @@
           <a:p>
             <a:fld id="{FD54D0EF-4AF0-8F43-A2C6-33201B0A59D3}" type="datetime1">
               <a:rPr lang="en-GB" smtClean="0"/>
-              <a:t>12/08/2022</a:t>
+              <a:t>02/07/2024</a:t>
             </a:fld>
             <a:endParaRPr lang="en-US"/>
           </a:p>
@@ -3791,8 +3791,27 @@
           <a:p>
             <a:pPr algn="ctr"/>
             <a:r>
-              <a:rPr lang="en-US" dirty="0"/>
+              <a:rPr lang="en-US" dirty="0">
+                <a:solidFill>
+                  <a:srgbClr val="FF0000"/>
+                </a:solidFill>
+              </a:rPr>
               <a:t>Architecture</a:t>
+            </a:r>
+            <a:br>
+              <a:rPr lang="en-US" dirty="0">
+                <a:solidFill>
+                  <a:srgbClr val="FF0000"/>
+                </a:solidFill>
+              </a:rPr>
+            </a:br>
+            <a:r>
+              <a:rPr lang="en-US" dirty="0">
+                <a:solidFill>
+                  <a:srgbClr val="FF0000"/>
+                </a:solidFill>
+              </a:rPr>
+              <a:t>NEEDS TO BE REVISED</a:t>
             </a:r>
           </a:p>
         </p:txBody>

</xml_diff>